<commit_message>
legal arch draft 1
</commit_message>
<xml_diff>
--- a/sbu/_docdev/images/sbu-legal-architecture-diagrams.pptx
+++ b/sbu/_docdev/images/sbu-legal-architecture-diagrams.pptx
@@ -6086,8 +6086,8 @@
         </p:nvSpPr>
         <p:spPr>
           <a:xfrm>
-            <a:off x="4648199" y="125951"/>
-            <a:ext cx="4300039" cy="3660787"/>
+            <a:off x="5247281" y="125951"/>
+            <a:ext cx="3700957" cy="3660787"/>
           </a:xfrm>
           <a:prstGeom prst="rect">
             <a:avLst/>
@@ -6134,8 +6134,8 @@
         </p:nvSpPr>
         <p:spPr>
           <a:xfrm>
-            <a:off x="4648200" y="5037704"/>
-            <a:ext cx="4310556" cy="533400"/>
+            <a:off x="5257800" y="5037704"/>
+            <a:ext cx="3700956" cy="533400"/>
           </a:xfrm>
           <a:prstGeom prst="roundRect">
             <a:avLst/>
@@ -6181,8 +6181,8 @@
         </p:nvSpPr>
         <p:spPr>
           <a:xfrm>
-            <a:off x="4648200" y="3786738"/>
-            <a:ext cx="4310556" cy="647659"/>
+            <a:off x="5257800" y="3786738"/>
+            <a:ext cx="3700956" cy="647659"/>
           </a:xfrm>
           <a:prstGeom prst="roundRect">
             <a:avLst/>
@@ -6238,7 +6238,7 @@
         <p:spPr>
           <a:xfrm>
             <a:off x="195756" y="887950"/>
-            <a:ext cx="1600200" cy="3556815"/>
+            <a:ext cx="1415670" cy="3556815"/>
           </a:xfrm>
           <a:prstGeom prst="roundRect">
             <a:avLst>
@@ -6302,8 +6302,8 @@
         </p:nvSpPr>
         <p:spPr>
           <a:xfrm>
-            <a:off x="4648200" y="2338871"/>
-            <a:ext cx="4300038" cy="682680"/>
+            <a:off x="5257800" y="2338871"/>
+            <a:ext cx="3690438" cy="682680"/>
           </a:xfrm>
           <a:prstGeom prst="roundRect">
             <a:avLst/>
@@ -6349,8 +6349,8 @@
         </p:nvSpPr>
         <p:spPr>
           <a:xfrm>
-            <a:off x="4655551" y="226975"/>
-            <a:ext cx="4300037" cy="338554"/>
+            <a:off x="5265150" y="226975"/>
+            <a:ext cx="3690438" cy="338554"/>
           </a:xfrm>
           <a:prstGeom prst="rect">
             <a:avLst/>
@@ -6383,7 +6383,7 @@
         </p:nvCxnSpPr>
         <p:spPr>
           <a:xfrm>
-            <a:off x="6798219" y="3021551"/>
+            <a:off x="7103019" y="3021551"/>
             <a:ext cx="5259" cy="765187"/>
           </a:xfrm>
           <a:prstGeom prst="straightConnector1">
@@ -6417,8 +6417,8 @@
         </p:nvSpPr>
         <p:spPr>
           <a:xfrm>
-            <a:off x="4655552" y="565529"/>
-            <a:ext cx="4303204" cy="1019440"/>
+            <a:off x="5257798" y="565529"/>
+            <a:ext cx="3700957" cy="1019440"/>
           </a:xfrm>
           <a:prstGeom prst="roundRect">
             <a:avLst/>
@@ -6482,8 +6482,8 @@
         </p:nvCxnSpPr>
         <p:spPr>
           <a:xfrm>
-            <a:off x="6798219" y="1641853"/>
-            <a:ext cx="0" cy="697018"/>
+            <a:off x="7103019" y="1650690"/>
+            <a:ext cx="0" cy="688181"/>
           </a:xfrm>
           <a:prstGeom prst="straightConnector1">
             <a:avLst/>
@@ -6516,8 +6516,8 @@
         </p:nvSpPr>
         <p:spPr>
           <a:xfrm>
-            <a:off x="1795956" y="1097046"/>
-            <a:ext cx="2852244" cy="304800"/>
+            <a:off x="1618779" y="1097046"/>
+            <a:ext cx="3617983" cy="304800"/>
           </a:xfrm>
           <a:prstGeom prst="leftRightArrow">
             <a:avLst/>
@@ -6554,8 +6554,8 @@
         </p:nvSpPr>
         <p:spPr>
           <a:xfrm>
-            <a:off x="1795956" y="2533507"/>
-            <a:ext cx="2852244" cy="304800"/>
+            <a:off x="1611425" y="2533507"/>
+            <a:ext cx="3625337" cy="304800"/>
           </a:xfrm>
           <a:prstGeom prst="leftRightArrow">
             <a:avLst/>
@@ -6592,8 +6592,8 @@
         </p:nvSpPr>
         <p:spPr>
           <a:xfrm>
-            <a:off x="1795956" y="3978160"/>
-            <a:ext cx="2852244" cy="304800"/>
+            <a:off x="1618779" y="3978160"/>
+            <a:ext cx="3617983" cy="304800"/>
           </a:xfrm>
           <a:prstGeom prst="leftRightArrow">
             <a:avLst/>
@@ -6630,7 +6630,7 @@
         </p:nvSpPr>
         <p:spPr>
           <a:xfrm>
-            <a:off x="2764500" y="761402"/>
+            <a:off x="2944863" y="720129"/>
             <a:ext cx="914400" cy="990599"/>
           </a:xfrm>
           <a:prstGeom prst="foldedCorner">
@@ -6684,7 +6684,7 @@
         </p:nvSpPr>
         <p:spPr>
           <a:xfrm>
-            <a:off x="3301080" y="2190607"/>
+            <a:off x="3967530" y="2145041"/>
             <a:ext cx="914400" cy="990599"/>
           </a:xfrm>
           <a:prstGeom prst="foldedCorner">
@@ -6732,13 +6732,13 @@
       </p:sp>
       <p:sp>
         <p:nvSpPr>
-          <p:cNvPr id="39" name="Folded Corner 38"/>
+          <p:cNvPr id="42" name="Folded Corner 41"/>
           <p:cNvSpPr/>
           <p:nvPr/>
         </p:nvSpPr>
         <p:spPr>
           <a:xfrm>
-            <a:off x="2234280" y="2190607"/>
+            <a:off x="3988311" y="3644731"/>
             <a:ext cx="914400" cy="990599"/>
           </a:xfrm>
           <a:prstGeom prst="foldedCorner">
@@ -6779,20 +6779,20 @@
                   <a:srgbClr val="000090"/>
                 </a:solidFill>
               </a:rPr>
-              <a:t>Transaction Endorser Agreement</a:t>
-            </a:r>
-          </a:p>
-        </p:txBody>
-      </p:sp>
-      <p:sp>
-        <p:nvSpPr>
-          <p:cNvPr id="42" name="Folded Corner 41"/>
+              <a:t>Data Processing Agreement</a:t>
+            </a:r>
+          </a:p>
+        </p:txBody>
+      </p:sp>
+      <p:sp>
+        <p:nvSpPr>
+          <p:cNvPr id="43" name="Folded Corner 42"/>
           <p:cNvSpPr/>
           <p:nvPr/>
         </p:nvSpPr>
         <p:spPr>
           <a:xfrm>
-            <a:off x="3301080" y="3635260"/>
+            <a:off x="2929558" y="3644730"/>
             <a:ext cx="914400" cy="990599"/>
           </a:xfrm>
           <a:prstGeom prst="foldedCorner">
@@ -6833,72 +6833,7 @@
                   <a:srgbClr val="000090"/>
                 </a:solidFill>
               </a:rPr>
-              <a:t>Data Processing Agreement</a:t>
-            </a:r>
-          </a:p>
-        </p:txBody>
-      </p:sp>
-      <p:sp>
-        <p:nvSpPr>
-          <p:cNvPr id="43" name="Folded Corner 42"/>
-          <p:cNvSpPr/>
-          <p:nvPr/>
-        </p:nvSpPr>
-        <p:spPr>
-          <a:xfrm>
-            <a:off x="2234280" y="3635260"/>
-            <a:ext cx="914400" cy="990599"/>
-          </a:xfrm>
-          <a:prstGeom prst="foldedCorner">
-            <a:avLst/>
-          </a:prstGeom>
-          <a:solidFill>
-            <a:schemeClr val="accent6">
-              <a:lumMod val="20000"/>
-              <a:lumOff val="80000"/>
-            </a:schemeClr>
-          </a:solidFill>
-          <a:ln>
-            <a:noFill/>
-          </a:ln>
-        </p:spPr>
-        <p:style>
-          <a:lnRef idx="1">
-            <a:schemeClr val="accent1"/>
-          </a:lnRef>
-          <a:fillRef idx="3">
-            <a:schemeClr val="accent1"/>
-          </a:fillRef>
-          <a:effectRef idx="2">
-            <a:schemeClr val="accent1"/>
-          </a:effectRef>
-          <a:fontRef idx="minor">
-            <a:schemeClr val="lt1"/>
-          </a:fontRef>
-        </p:style>
-        <p:txBody>
-          <a:bodyPr lIns="0" rIns="0" rtlCol="0" anchor="ctr"/>
-          <a:lstStyle/>
-          <a:p>
-            <a:pPr algn="ctr"/>
-            <a:r>
-              <a:rPr lang="en-US" sz="1200" dirty="0">
-                <a:solidFill>
-                  <a:srgbClr val="000090"/>
-                </a:solidFill>
-              </a:rPr>
-              <a:t>DIBE </a:t>
-            </a:r>
-          </a:p>
-          <a:p>
-            <a:pPr algn="ctr"/>
-            <a:r>
-              <a:rPr lang="en-US" sz="1200" dirty="0">
-                <a:solidFill>
-                  <a:srgbClr val="000090"/>
-                </a:solidFill>
-              </a:rPr>
-              <a:t>Member Agreement</a:t>
+              <a:t>Steward Agreement</a:t>
             </a:r>
           </a:p>
         </p:txBody>
@@ -6911,7 +6846,7 @@
         </p:nvSpPr>
         <p:spPr>
           <a:xfrm>
-            <a:off x="5758356" y="1717985"/>
+            <a:off x="6161170" y="1684704"/>
             <a:ext cx="914400" cy="461665"/>
           </a:xfrm>
           <a:prstGeom prst="rect">
@@ -6925,6 +6860,7 @@
           </a:bodyPr>
           <a:lstStyle/>
           <a:p>
+            <a:pPr algn="ctr"/>
             <a:r>
               <a:rPr lang="en-US" sz="1200" dirty="0"/>
               <a:t>Submits Transaction</a:t>
@@ -6936,6 +6872,7 @@
         <p:nvCxnSpPr>
           <p:cNvPr id="44" name="Straight Arrow Connector 43"/>
           <p:cNvCxnSpPr>
+            <a:cxnSpLocks/>
             <a:stCxn id="8" idx="2"/>
             <a:endCxn id="3" idx="0"/>
           </p:cNvCxnSpPr>
@@ -6943,7 +6880,7 @@
         </p:nvCxnSpPr>
         <p:spPr>
           <a:xfrm>
-            <a:off x="6803478" y="4434397"/>
+            <a:off x="7108278" y="4434397"/>
             <a:ext cx="0" cy="603307"/>
           </a:xfrm>
           <a:prstGeom prst="straightConnector1">
@@ -6977,7 +6914,7 @@
         </p:nvSpPr>
         <p:spPr>
           <a:xfrm>
-            <a:off x="5758356" y="3124814"/>
+            <a:off x="7138571" y="3082366"/>
             <a:ext cx="914400" cy="461665"/>
           </a:xfrm>
           <a:prstGeom prst="rect">
@@ -6991,6 +6928,7 @@
           </a:bodyPr>
           <a:lstStyle/>
           <a:p>
+            <a:pPr algn="ctr"/>
             <a:r>
               <a:rPr lang="en-US" sz="1200" dirty="0"/>
               <a:t>Endorses Transaction</a:t>
@@ -7006,7 +6944,7 @@
         </p:nvSpPr>
         <p:spPr>
           <a:xfrm>
-            <a:off x="6809916" y="4444766"/>
+            <a:off x="6064597" y="4453034"/>
             <a:ext cx="914400" cy="461665"/>
           </a:xfrm>
           <a:prstGeom prst="rect">
@@ -7020,6 +6958,7 @@
           </a:bodyPr>
           <a:lstStyle/>
           <a:p>
+            <a:pPr algn="ctr"/>
             <a:r>
               <a:rPr lang="en-US" sz="1200" dirty="0"/>
               <a:t>Writes Transaction</a:t>
@@ -7189,7 +7128,7 @@
         </p:nvSpPr>
         <p:spPr>
           <a:xfrm>
-            <a:off x="7561464" y="1128203"/>
+            <a:off x="7786393" y="1137394"/>
             <a:ext cx="961192" cy="304800"/>
           </a:xfrm>
           <a:prstGeom prst="roundRect">
@@ -7328,7 +7267,7 @@
         </p:nvSpPr>
         <p:spPr>
           <a:xfrm>
-            <a:off x="5033320" y="1138027"/>
+            <a:off x="5403401" y="1145631"/>
             <a:ext cx="961192" cy="304800"/>
           </a:xfrm>
           <a:prstGeom prst="roundRect">
@@ -7382,7 +7321,7 @@
         </p:nvSpPr>
         <p:spPr>
           <a:xfrm>
-            <a:off x="6297392" y="1137394"/>
+            <a:off x="6580952" y="1145631"/>
             <a:ext cx="961192" cy="304800"/>
           </a:xfrm>
           <a:prstGeom prst="roundRect">
@@ -7419,6 +7358,120 @@
               <a:t>Holder</a:t>
             </a:r>
             <a:endParaRPr lang="en-US" dirty="0"/>
+          </a:p>
+        </p:txBody>
+      </p:sp>
+      <p:sp>
+        <p:nvSpPr>
+          <p:cNvPr id="50" name="Folded Corner 49">
+            <a:extLst>
+              <a:ext uri="{FF2B5EF4-FFF2-40B4-BE49-F238E27FC236}">
+                <a16:creationId xmlns:a16="http://schemas.microsoft.com/office/drawing/2014/main" id="{0E5416E3-F517-3F47-B2FA-56F497DFD470}"/>
+              </a:ext>
+            </a:extLst>
+          </p:cNvPr>
+          <p:cNvSpPr/>
+          <p:nvPr/>
+        </p:nvSpPr>
+        <p:spPr>
+          <a:xfrm>
+            <a:off x="1942493" y="2205961"/>
+            <a:ext cx="914400" cy="990599"/>
+          </a:xfrm>
+          <a:prstGeom prst="foldedCorner">
+            <a:avLst/>
+          </a:prstGeom>
+          <a:solidFill>
+            <a:schemeClr val="accent6">
+              <a:lumMod val="20000"/>
+              <a:lumOff val="80000"/>
+            </a:schemeClr>
+          </a:solidFill>
+          <a:ln>
+            <a:noFill/>
+          </a:ln>
+        </p:spPr>
+        <p:style>
+          <a:lnRef idx="1">
+            <a:schemeClr val="accent1"/>
+          </a:lnRef>
+          <a:fillRef idx="3">
+            <a:schemeClr val="accent1"/>
+          </a:fillRef>
+          <a:effectRef idx="2">
+            <a:schemeClr val="accent1"/>
+          </a:effectRef>
+          <a:fontRef idx="minor">
+            <a:schemeClr val="lt1"/>
+          </a:fontRef>
+        </p:style>
+        <p:txBody>
+          <a:bodyPr lIns="0" rIns="0" rtlCol="0" anchor="ctr"/>
+          <a:lstStyle/>
+          <a:p>
+            <a:pPr algn="ctr"/>
+            <a:r>
+              <a:rPr lang="en-US" sz="1200" dirty="0">
+                <a:solidFill>
+                  <a:srgbClr val="000090"/>
+                </a:solidFill>
+              </a:rPr>
+              <a:t>Subscriber Agreement</a:t>
+            </a:r>
+          </a:p>
+        </p:txBody>
+      </p:sp>
+      <p:sp>
+        <p:nvSpPr>
+          <p:cNvPr id="39" name="Folded Corner 38"/>
+          <p:cNvSpPr/>
+          <p:nvPr/>
+        </p:nvSpPr>
+        <p:spPr>
+          <a:xfrm>
+            <a:off x="2944863" y="2184911"/>
+            <a:ext cx="914400" cy="990599"/>
+          </a:xfrm>
+          <a:prstGeom prst="foldedCorner">
+            <a:avLst/>
+          </a:prstGeom>
+          <a:solidFill>
+            <a:schemeClr val="accent6">
+              <a:lumMod val="20000"/>
+              <a:lumOff val="80000"/>
+            </a:schemeClr>
+          </a:solidFill>
+          <a:ln>
+            <a:noFill/>
+          </a:ln>
+        </p:spPr>
+        <p:style>
+          <a:lnRef idx="1">
+            <a:schemeClr val="accent1"/>
+          </a:lnRef>
+          <a:fillRef idx="3">
+            <a:schemeClr val="accent1"/>
+          </a:fillRef>
+          <a:effectRef idx="2">
+            <a:schemeClr val="accent1"/>
+          </a:effectRef>
+          <a:fontRef idx="minor">
+            <a:schemeClr val="lt1"/>
+          </a:fontRef>
+        </p:style>
+        <p:txBody>
+          <a:bodyPr lIns="0" rIns="0" rtlCol="0" anchor="ctr"/>
+          <a:lstStyle/>
+          <a:p>
+            <a:pPr algn="ctr"/>
+            <a:r>
+              <a:rPr lang="en-US" sz="1200" dirty="0">
+                <a:solidFill>
+                  <a:srgbClr val="000090"/>
+                </a:solidFill>
+              </a:rPr>
+              <a:t>Transaction Endorser Agreement</a:t>
+            </a:r>
           </a:p>
         </p:txBody>
       </p:sp>

</xml_diff>